<commit_message>
first version before review
</commit_message>
<xml_diff>
--- a/figures/casestudy.pptx
+++ b/figures/casestudy.pptx
@@ -243,7 +243,7 @@
           <a:p>
             <a:fld id="{C91B5E2F-55F6-487A-A7C7-FE3A947FB2D0}" type="datetimeFigureOut">
               <a:rPr lang="fr-FR" smtClean="0"/>
-              <a:t>16/09/2016</a:t>
+              <a:t>26/09/2016</a:t>
             </a:fld>
             <a:endParaRPr lang="fr-FR"/>
           </a:p>
@@ -413,7 +413,7 @@
           <a:p>
             <a:fld id="{C91B5E2F-55F6-487A-A7C7-FE3A947FB2D0}" type="datetimeFigureOut">
               <a:rPr lang="fr-FR" smtClean="0"/>
-              <a:t>16/09/2016</a:t>
+              <a:t>26/09/2016</a:t>
             </a:fld>
             <a:endParaRPr lang="fr-FR"/>
           </a:p>
@@ -593,7 +593,7 @@
           <a:p>
             <a:fld id="{C91B5E2F-55F6-487A-A7C7-FE3A947FB2D0}" type="datetimeFigureOut">
               <a:rPr lang="fr-FR" smtClean="0"/>
-              <a:t>16/09/2016</a:t>
+              <a:t>26/09/2016</a:t>
             </a:fld>
             <a:endParaRPr lang="fr-FR"/>
           </a:p>
@@ -763,7 +763,7 @@
           <a:p>
             <a:fld id="{C91B5E2F-55F6-487A-A7C7-FE3A947FB2D0}" type="datetimeFigureOut">
               <a:rPr lang="fr-FR" smtClean="0"/>
-              <a:t>16/09/2016</a:t>
+              <a:t>26/09/2016</a:t>
             </a:fld>
             <a:endParaRPr lang="fr-FR"/>
           </a:p>
@@ -1009,7 +1009,7 @@
           <a:p>
             <a:fld id="{C91B5E2F-55F6-487A-A7C7-FE3A947FB2D0}" type="datetimeFigureOut">
               <a:rPr lang="fr-FR" smtClean="0"/>
-              <a:t>16/09/2016</a:t>
+              <a:t>26/09/2016</a:t>
             </a:fld>
             <a:endParaRPr lang="fr-FR"/>
           </a:p>
@@ -1241,7 +1241,7 @@
           <a:p>
             <a:fld id="{C91B5E2F-55F6-487A-A7C7-FE3A947FB2D0}" type="datetimeFigureOut">
               <a:rPr lang="fr-FR" smtClean="0"/>
-              <a:t>16/09/2016</a:t>
+              <a:t>26/09/2016</a:t>
             </a:fld>
             <a:endParaRPr lang="fr-FR"/>
           </a:p>
@@ -1608,7 +1608,7 @@
           <a:p>
             <a:fld id="{C91B5E2F-55F6-487A-A7C7-FE3A947FB2D0}" type="datetimeFigureOut">
               <a:rPr lang="fr-FR" smtClean="0"/>
-              <a:t>16/09/2016</a:t>
+              <a:t>26/09/2016</a:t>
             </a:fld>
             <a:endParaRPr lang="fr-FR"/>
           </a:p>
@@ -1726,7 +1726,7 @@
           <a:p>
             <a:fld id="{C91B5E2F-55F6-487A-A7C7-FE3A947FB2D0}" type="datetimeFigureOut">
               <a:rPr lang="fr-FR" smtClean="0"/>
-              <a:t>16/09/2016</a:t>
+              <a:t>26/09/2016</a:t>
             </a:fld>
             <a:endParaRPr lang="fr-FR"/>
           </a:p>
@@ -1821,7 +1821,7 @@
           <a:p>
             <a:fld id="{C91B5E2F-55F6-487A-A7C7-FE3A947FB2D0}" type="datetimeFigureOut">
               <a:rPr lang="fr-FR" smtClean="0"/>
-              <a:t>16/09/2016</a:t>
+              <a:t>26/09/2016</a:t>
             </a:fld>
             <a:endParaRPr lang="fr-FR"/>
           </a:p>
@@ -2098,7 +2098,7 @@
           <a:p>
             <a:fld id="{C91B5E2F-55F6-487A-A7C7-FE3A947FB2D0}" type="datetimeFigureOut">
               <a:rPr lang="fr-FR" smtClean="0"/>
-              <a:t>16/09/2016</a:t>
+              <a:t>26/09/2016</a:t>
             </a:fld>
             <a:endParaRPr lang="fr-FR"/>
           </a:p>
@@ -2351,7 +2351,7 @@
           <a:p>
             <a:fld id="{C91B5E2F-55F6-487A-A7C7-FE3A947FB2D0}" type="datetimeFigureOut">
               <a:rPr lang="fr-FR" smtClean="0"/>
-              <a:t>16/09/2016</a:t>
+              <a:t>26/09/2016</a:t>
             </a:fld>
             <a:endParaRPr lang="fr-FR"/>
           </a:p>
@@ -2564,7 +2564,7 @@
           <a:p>
             <a:fld id="{C91B5E2F-55F6-487A-A7C7-FE3A947FB2D0}" type="datetimeFigureOut">
               <a:rPr lang="fr-FR" smtClean="0"/>
-              <a:t>16/09/2016</a:t>
+              <a:t>26/09/2016</a:t>
             </a:fld>
             <a:endParaRPr lang="fr-FR"/>
           </a:p>
@@ -2977,10 +2977,10 @@
         </p:nvGrpSpPr>
         <p:grpSpPr>
           <a:xfrm>
-            <a:off x="0" y="-72421"/>
-            <a:ext cx="4479357" cy="3247394"/>
-            <a:chOff x="678403" y="762447"/>
-            <a:chExt cx="4479357" cy="3247394"/>
+            <a:off x="-81481" y="541615"/>
+            <a:ext cx="4523177" cy="1756569"/>
+            <a:chOff x="678403" y="575676"/>
+            <a:chExt cx="4479357" cy="3284249"/>
           </a:xfrm>
         </p:grpSpPr>
         <p:cxnSp>
@@ -3209,138 +3209,53 @@
           </p:nvGrpSpPr>
           <p:grpSpPr>
             <a:xfrm>
-              <a:off x="2636700" y="898827"/>
-              <a:ext cx="280846" cy="633223"/>
-              <a:chOff x="2636700" y="898827"/>
-              <a:chExt cx="280846" cy="633223"/>
+              <a:off x="2627176" y="1015501"/>
+              <a:ext cx="280846" cy="516548"/>
+              <a:chOff x="2627176" y="1015501"/>
+              <a:chExt cx="280846" cy="516548"/>
             </a:xfrm>
           </p:grpSpPr>
-          <p:grpSp>
-            <p:nvGrpSpPr>
-              <p:cNvPr id="39" name="Groupe 38"/>
-              <p:cNvGrpSpPr/>
+          <p:sp>
+            <p:nvSpPr>
+              <p:cNvPr id="29" name="Rectangle 28"/>
+              <p:cNvSpPr/>
               <p:nvPr/>
-            </p:nvGrpSpPr>
-            <p:grpSpPr>
+            </p:nvSpPr>
+            <p:spPr>
               <a:xfrm>
-                <a:off x="2657640" y="1122021"/>
-                <a:ext cx="219919" cy="410029"/>
-                <a:chOff x="5741043" y="573819"/>
-                <a:chExt cx="219919" cy="410029"/>
+                <a:off x="2657640" y="1122022"/>
+                <a:ext cx="219919" cy="410027"/>
               </a:xfrm>
-            </p:grpSpPr>
-            <p:sp>
-              <p:nvSpPr>
-                <p:cNvPr id="29" name="Rectangle 28"/>
-                <p:cNvSpPr/>
-                <p:nvPr/>
-              </p:nvSpPr>
-              <p:spPr>
-                <a:xfrm>
-                  <a:off x="5741043" y="573820"/>
-                  <a:ext cx="219919" cy="410027"/>
-                </a:xfrm>
-                <a:prstGeom prst="rect">
-                  <a:avLst/>
-                </a:prstGeom>
-                <a:noFill/>
-              </p:spPr>
-              <p:style>
-                <a:lnRef idx="2">
-                  <a:schemeClr val="accent1">
-                    <a:shade val="50000"/>
-                  </a:schemeClr>
-                </a:lnRef>
-                <a:fillRef idx="1">
-                  <a:schemeClr val="accent1"/>
-                </a:fillRef>
-                <a:effectRef idx="0">
-                  <a:schemeClr val="accent1"/>
-                </a:effectRef>
-                <a:fontRef idx="minor">
-                  <a:schemeClr val="lt1"/>
-                </a:fontRef>
-              </p:style>
-              <p:txBody>
-                <a:bodyPr rtlCol="0" anchor="ctr"/>
-                <a:lstStyle/>
-                <a:p>
-                  <a:pPr algn="ctr"/>
-                  <a:endParaRPr lang="fr-FR" sz="1400"/>
-                </a:p>
-              </p:txBody>
-            </p:sp>
-            <p:cxnSp>
-              <p:nvCxnSpPr>
-                <p:cNvPr id="34" name="Connecteur droit 33"/>
-                <p:cNvCxnSpPr/>
-                <p:nvPr/>
-              </p:nvCxnSpPr>
-              <p:spPr>
-                <a:xfrm>
-                  <a:off x="5741043" y="610413"/>
-                  <a:ext cx="219919" cy="373435"/>
-                </a:xfrm>
-                <a:prstGeom prst="line">
-                  <a:avLst/>
-                </a:prstGeom>
-                <a:ln>
-                  <a:solidFill>
-                    <a:schemeClr val="tx1"/>
-                  </a:solidFill>
-                </a:ln>
-              </p:spPr>
-              <p:style>
-                <a:lnRef idx="1">
-                  <a:schemeClr val="accent1"/>
-                </a:lnRef>
-                <a:fillRef idx="0">
-                  <a:schemeClr val="accent1"/>
-                </a:fillRef>
-                <a:effectRef idx="0">
-                  <a:schemeClr val="accent1"/>
-                </a:effectRef>
-                <a:fontRef idx="minor">
-                  <a:schemeClr val="tx1"/>
-                </a:fontRef>
-              </p:style>
-            </p:cxnSp>
-            <p:cxnSp>
-              <p:nvCxnSpPr>
-                <p:cNvPr id="36" name="Connecteur droit 35"/>
-                <p:cNvCxnSpPr/>
-                <p:nvPr/>
-              </p:nvCxnSpPr>
-              <p:spPr>
-                <a:xfrm flipH="1">
-                  <a:off x="5741044" y="573819"/>
-                  <a:ext cx="219918" cy="410029"/>
-                </a:xfrm>
-                <a:prstGeom prst="line">
-                  <a:avLst/>
-                </a:prstGeom>
-                <a:ln>
-                  <a:solidFill>
-                    <a:schemeClr val="tx1"/>
-                  </a:solidFill>
-                </a:ln>
-              </p:spPr>
-              <p:style>
-                <a:lnRef idx="1">
-                  <a:schemeClr val="accent1"/>
-                </a:lnRef>
-                <a:fillRef idx="0">
-                  <a:schemeClr val="accent1"/>
-                </a:fillRef>
-                <a:effectRef idx="0">
-                  <a:schemeClr val="accent1"/>
-                </a:effectRef>
-                <a:fontRef idx="minor">
-                  <a:schemeClr val="tx1"/>
-                </a:fontRef>
-              </p:style>
-            </p:cxnSp>
-          </p:grpSp>
+              <a:prstGeom prst="rect">
+                <a:avLst/>
+              </a:prstGeom>
+              <a:noFill/>
+            </p:spPr>
+            <p:style>
+              <a:lnRef idx="2">
+                <a:schemeClr val="accent1">
+                  <a:shade val="50000"/>
+                </a:schemeClr>
+              </a:lnRef>
+              <a:fillRef idx="1">
+                <a:schemeClr val="accent1"/>
+              </a:fillRef>
+              <a:effectRef idx="0">
+                <a:schemeClr val="accent1"/>
+              </a:effectRef>
+              <a:fontRef idx="minor">
+                <a:schemeClr val="lt1"/>
+              </a:fontRef>
+            </p:style>
+            <p:txBody>
+              <a:bodyPr rtlCol="0" anchor="ctr"/>
+              <a:lstStyle/>
+              <a:p>
+                <a:pPr algn="ctr"/>
+                <a:endParaRPr lang="fr-FR" sz="1400"/>
+              </a:p>
+            </p:txBody>
+          </p:sp>
           <p:sp>
             <p:nvSpPr>
               <p:cNvPr id="40" name="ZoneTexte 39"/>
@@ -3349,8 +3264,8 @@
             </p:nvSpPr>
             <p:spPr>
               <a:xfrm>
-                <a:off x="2636700" y="898827"/>
-                <a:ext cx="280846" cy="307777"/>
+                <a:off x="2627176" y="1015501"/>
+                <a:ext cx="280846" cy="307778"/>
               </a:xfrm>
               <a:prstGeom prst="rect">
                 <a:avLst/>
@@ -3380,138 +3295,53 @@
           </p:nvGrpSpPr>
           <p:grpSpPr>
             <a:xfrm>
-              <a:off x="2954634" y="3249816"/>
-              <a:ext cx="280846" cy="653023"/>
-              <a:chOff x="2439930" y="1022764"/>
-              <a:chExt cx="280846" cy="653023"/>
+              <a:off x="2956800" y="3212742"/>
+              <a:ext cx="280846" cy="447474"/>
+              <a:chOff x="2442096" y="985690"/>
+              <a:chExt cx="280846" cy="447474"/>
             </a:xfrm>
           </p:grpSpPr>
-          <p:grpSp>
-            <p:nvGrpSpPr>
-              <p:cNvPr id="43" name="Groupe 42"/>
-              <p:cNvGrpSpPr/>
+          <p:sp>
+            <p:nvSpPr>
+              <p:cNvPr id="45" name="Rectangle 44"/>
+              <p:cNvSpPr/>
               <p:nvPr/>
-            </p:nvGrpSpPr>
-            <p:grpSpPr>
+            </p:nvSpPr>
+            <p:spPr>
               <a:xfrm>
                 <a:off x="2484015" y="1022764"/>
-                <a:ext cx="236761" cy="410400"/>
-                <a:chOff x="5567418" y="474562"/>
-                <a:chExt cx="236761" cy="410400"/>
+                <a:ext cx="219919" cy="410400"/>
               </a:xfrm>
-            </p:grpSpPr>
-            <p:sp>
-              <p:nvSpPr>
-                <p:cNvPr id="45" name="Rectangle 44"/>
-                <p:cNvSpPr/>
-                <p:nvPr/>
-              </p:nvSpPr>
-              <p:spPr>
-                <a:xfrm>
-                  <a:off x="5567418" y="474562"/>
-                  <a:ext cx="219919" cy="410400"/>
-                </a:xfrm>
-                <a:prstGeom prst="rect">
-                  <a:avLst/>
-                </a:prstGeom>
-                <a:noFill/>
-              </p:spPr>
-              <p:style>
-                <a:lnRef idx="2">
-                  <a:schemeClr val="accent1">
-                    <a:shade val="50000"/>
-                  </a:schemeClr>
-                </a:lnRef>
-                <a:fillRef idx="1">
-                  <a:schemeClr val="accent1"/>
-                </a:fillRef>
-                <a:effectRef idx="0">
-                  <a:schemeClr val="accent1"/>
-                </a:effectRef>
-                <a:fontRef idx="minor">
-                  <a:schemeClr val="lt1"/>
-                </a:fontRef>
-              </p:style>
-              <p:txBody>
-                <a:bodyPr rtlCol="0" anchor="ctr"/>
-                <a:lstStyle/>
-                <a:p>
-                  <a:pPr algn="ctr"/>
-                  <a:endParaRPr lang="fr-FR" sz="1400"/>
-                </a:p>
-              </p:txBody>
-            </p:sp>
-            <p:cxnSp>
-              <p:nvCxnSpPr>
-                <p:cNvPr id="46" name="Connecteur droit 45"/>
-                <p:cNvCxnSpPr/>
-                <p:nvPr/>
-              </p:nvCxnSpPr>
-              <p:spPr>
-                <a:xfrm>
-                  <a:off x="5567423" y="474562"/>
-                  <a:ext cx="236756" cy="383450"/>
-                </a:xfrm>
-                <a:prstGeom prst="line">
-                  <a:avLst/>
-                </a:prstGeom>
-                <a:ln>
-                  <a:solidFill>
-                    <a:schemeClr val="tx1"/>
-                  </a:solidFill>
-                </a:ln>
-              </p:spPr>
-              <p:style>
-                <a:lnRef idx="1">
-                  <a:schemeClr val="accent1"/>
-                </a:lnRef>
-                <a:fillRef idx="0">
-                  <a:schemeClr val="accent1"/>
-                </a:fillRef>
-                <a:effectRef idx="0">
-                  <a:schemeClr val="accent1"/>
-                </a:effectRef>
-                <a:fontRef idx="minor">
-                  <a:schemeClr val="tx1"/>
-                </a:fontRef>
-              </p:style>
-            </p:cxnSp>
-            <p:cxnSp>
-              <p:nvCxnSpPr>
-                <p:cNvPr id="47" name="Connecteur droit 46"/>
-                <p:cNvCxnSpPr/>
-                <p:nvPr/>
-              </p:nvCxnSpPr>
-              <p:spPr>
-                <a:xfrm flipH="1">
-                  <a:off x="5567418" y="474562"/>
-                  <a:ext cx="219925" cy="374632"/>
-                </a:xfrm>
-                <a:prstGeom prst="line">
-                  <a:avLst/>
-                </a:prstGeom>
-                <a:ln>
-                  <a:solidFill>
-                    <a:schemeClr val="tx1"/>
-                  </a:solidFill>
-                </a:ln>
-              </p:spPr>
-              <p:style>
-                <a:lnRef idx="1">
-                  <a:schemeClr val="accent1"/>
-                </a:lnRef>
-                <a:fillRef idx="0">
-                  <a:schemeClr val="accent1"/>
-                </a:fillRef>
-                <a:effectRef idx="0">
-                  <a:schemeClr val="accent1"/>
-                </a:effectRef>
-                <a:fontRef idx="minor">
-                  <a:schemeClr val="tx1"/>
-                </a:fontRef>
-              </p:style>
-            </p:cxnSp>
-          </p:grpSp>
+              <a:prstGeom prst="rect">
+                <a:avLst/>
+              </a:prstGeom>
+              <a:noFill/>
+            </p:spPr>
+            <p:style>
+              <a:lnRef idx="2">
+                <a:schemeClr val="accent1">
+                  <a:shade val="50000"/>
+                </a:schemeClr>
+              </a:lnRef>
+              <a:fillRef idx="1">
+                <a:schemeClr val="accent1"/>
+              </a:fillRef>
+              <a:effectRef idx="0">
+                <a:schemeClr val="accent1"/>
+              </a:effectRef>
+              <a:fontRef idx="minor">
+                <a:schemeClr val="lt1"/>
+              </a:fontRef>
+            </p:style>
+            <p:txBody>
+              <a:bodyPr rtlCol="0" anchor="ctr"/>
+              <a:lstStyle/>
+              <a:p>
+                <a:pPr algn="ctr"/>
+                <a:endParaRPr lang="fr-FR" sz="1400"/>
+              </a:p>
+            </p:txBody>
+          </p:sp>
           <p:sp>
             <p:nvSpPr>
               <p:cNvPr id="44" name="ZoneTexte 43"/>
@@ -3520,8 +3350,8 @@
             </p:nvSpPr>
             <p:spPr>
               <a:xfrm>
-                <a:off x="2439930" y="1368010"/>
-                <a:ext cx="280846" cy="307777"/>
+                <a:off x="2442096" y="985690"/>
+                <a:ext cx="280846" cy="307776"/>
               </a:xfrm>
               <a:prstGeom prst="rect">
                 <a:avLst/>
@@ -4021,8 +3851,8 @@
           </p:nvSpPr>
           <p:spPr>
             <a:xfrm>
-              <a:off x="4111448" y="1601244"/>
-              <a:ext cx="808106" cy="307777"/>
+              <a:off x="4129883" y="1532141"/>
+              <a:ext cx="808106" cy="307776"/>
             </a:xfrm>
             <a:prstGeom prst="rect">
               <a:avLst/>
@@ -4051,8 +3881,8 @@
           </p:nvSpPr>
           <p:spPr>
             <a:xfrm>
-              <a:off x="895606" y="2851759"/>
-              <a:ext cx="808106" cy="307777"/>
+              <a:off x="924746" y="2735049"/>
+              <a:ext cx="808106" cy="307776"/>
             </a:xfrm>
             <a:prstGeom prst="rect">
               <a:avLst/>
@@ -4081,8 +3911,8 @@
           </p:nvSpPr>
           <p:spPr>
             <a:xfrm>
-              <a:off x="2498030" y="762447"/>
-              <a:ext cx="843372" cy="307777"/>
+              <a:off x="2491582" y="575676"/>
+              <a:ext cx="843372" cy="307776"/>
             </a:xfrm>
             <a:prstGeom prst="rect">
               <a:avLst/>
@@ -4111,8 +3941,8 @@
           </p:nvSpPr>
           <p:spPr>
             <a:xfrm>
-              <a:off x="2525629" y="3702064"/>
-              <a:ext cx="843372" cy="307777"/>
+              <a:off x="2535114" y="3552149"/>
+              <a:ext cx="843372" cy="307776"/>
             </a:xfrm>
             <a:prstGeom prst="rect">
               <a:avLst/>
@@ -4156,7 +3986,7 @@
         </p:blipFill>
         <p:spPr>
           <a:xfrm>
-            <a:off x="4523177" y="781415"/>
+            <a:off x="4459806" y="763309"/>
             <a:ext cx="3633568" cy="1534474"/>
           </a:xfrm>
           <a:prstGeom prst="rect">
@@ -4177,8 +4007,8 @@
         </p:nvGrpSpPr>
         <p:grpSpPr>
           <a:xfrm>
-            <a:off x="1607046" y="151332"/>
-            <a:ext cx="213021" cy="528706"/>
+            <a:off x="1564959" y="684752"/>
+            <a:ext cx="191000" cy="333574"/>
             <a:chOff x="1634205" y="4143903"/>
             <a:chExt cx="312516" cy="720000"/>
           </a:xfrm>
@@ -4376,8 +4206,8 @@
         </p:nvGrpSpPr>
         <p:grpSpPr>
           <a:xfrm rot="5400000">
-            <a:off x="1437159" y="2294825"/>
-            <a:ext cx="213021" cy="528706"/>
+            <a:off x="1408294" y="1841271"/>
+            <a:ext cx="173918" cy="526280"/>
             <a:chOff x="1634205" y="4143903"/>
             <a:chExt cx="312516" cy="720000"/>
           </a:xfrm>
@@ -4575,8 +4405,8 @@
         </p:nvGrpSpPr>
         <p:grpSpPr>
           <a:xfrm>
-            <a:off x="2681384" y="2438843"/>
-            <a:ext cx="213021" cy="528706"/>
+            <a:off x="2626797" y="1999345"/>
+            <a:ext cx="222667" cy="298438"/>
             <a:chOff x="1634205" y="4143903"/>
             <a:chExt cx="312516" cy="720000"/>
           </a:xfrm>
@@ -4774,8 +4604,8 @@
         </p:nvGrpSpPr>
         <p:grpSpPr>
           <a:xfrm rot="5400000">
-            <a:off x="2811789" y="293584"/>
-            <a:ext cx="213021" cy="528706"/>
+            <a:off x="2741961" y="663498"/>
+            <a:ext cx="213928" cy="495734"/>
             <a:chOff x="1634205" y="4143903"/>
             <a:chExt cx="312516" cy="720000"/>
           </a:xfrm>

</xml_diff>